<commit_message>
added some screen shots
</commit_message>
<xml_diff>
--- a/docs/Askkit.pptx
+++ b/docs/Askkit.pptx
@@ -5,15 +5,18 @@
     <p:sldMasterId id="2147483776" r:id="rId1"/>
   </p:sldMasterIdLst>
   <p:notesMasterIdLst>
-    <p:notesMasterId r:id="rId8"/>
+    <p:notesMasterId r:id="rId11"/>
   </p:notesMasterIdLst>
   <p:sldIdLst>
     <p:sldId id="256" r:id="rId2"/>
     <p:sldId id="261" r:id="rId3"/>
     <p:sldId id="257" r:id="rId4"/>
-    <p:sldId id="258" r:id="rId5"/>
-    <p:sldId id="259" r:id="rId6"/>
-    <p:sldId id="260" r:id="rId7"/>
+    <p:sldId id="262" r:id="rId5"/>
+    <p:sldId id="258" r:id="rId6"/>
+    <p:sldId id="263" r:id="rId7"/>
+    <p:sldId id="264" r:id="rId8"/>
+    <p:sldId id="259" r:id="rId9"/>
+    <p:sldId id="260" r:id="rId10"/>
   </p:sldIdLst>
   <p:sldSz cx="12192000" cy="6858000"/>
   <p:notesSz cx="6858000" cy="9144000"/>
@@ -112,6 +115,11 @@
       </a:defRPr>
     </a:lvl9pPr>
   </p:defaultTextStyle>
+  <p:extLst>
+    <p:ext uri="{EFAFB233-063F-42B5-8137-9DF3F51BA10A}">
+      <p15:sldGuideLst xmlns:p15="http://schemas.microsoft.com/office/powerpoint/2012/main"/>
+    </p:ext>
+  </p:extLst>
 </p:presentation>
 </file>
 
@@ -11995,6 +12003,90 @@
           <a:bodyPr/>
           <a:lstStyle/>
           <a:p>
+            <a:endParaRPr lang="pt-PT" dirty="0"/>
+          </a:p>
+        </p:txBody>
+      </p:sp>
+      <p:sp>
+        <p:nvSpPr>
+          <p:cNvPr id="4" name="Marcador de Posição do Número do Diapositivo 3"/>
+          <p:cNvSpPr>
+            <a:spLocks noGrp="1"/>
+          </p:cNvSpPr>
+          <p:nvPr>
+            <p:ph type="sldNum" sz="quarter" idx="5"/>
+          </p:nvPr>
+        </p:nvSpPr>
+        <p:spPr/>
+        <p:txBody>
+          <a:bodyPr/>
+          <a:lstStyle/>
+          <a:p>
+            <a:fld id="{3FF727AB-6EB0-49A3-90CE-927644F1B1A0}" type="slidenum">
+              <a:rPr lang="pt-PT" smtClean="0"/>
+              <a:t>1</a:t>
+            </a:fld>
+            <a:endParaRPr lang="pt-PT"/>
+          </a:p>
+        </p:txBody>
+      </p:sp>
+    </p:spTree>
+    <p:extLst>
+      <p:ext uri="{BB962C8B-B14F-4D97-AF65-F5344CB8AC3E}">
+        <p14:creationId xmlns:p14="http://schemas.microsoft.com/office/powerpoint/2010/main" val="3078391030"/>
+      </p:ext>
+    </p:extLst>
+  </p:cSld>
+  <p:clrMapOvr>
+    <a:masterClrMapping/>
+  </p:clrMapOvr>
+</p:notes>
+</file>
+
+<file path=ppt/notesSlides/notesSlide2.xml><?xml version="1.0" encoding="utf-8"?>
+<p:notes xmlns:a="http://schemas.openxmlformats.org/drawingml/2006/main" xmlns:r="http://schemas.openxmlformats.org/officeDocument/2006/relationships" xmlns:p="http://schemas.openxmlformats.org/presentationml/2006/main">
+  <p:cSld>
+    <p:spTree>
+      <p:nvGrpSpPr>
+        <p:cNvPr id="1" name=""/>
+        <p:cNvGrpSpPr/>
+        <p:nvPr/>
+      </p:nvGrpSpPr>
+      <p:grpSpPr>
+        <a:xfrm>
+          <a:off x="0" y="0"/>
+          <a:ext cx="0" cy="0"/>
+          <a:chOff x="0" y="0"/>
+          <a:chExt cx="0" cy="0"/>
+        </a:xfrm>
+      </p:grpSpPr>
+      <p:sp>
+        <p:nvSpPr>
+          <p:cNvPr id="2" name="Marcador de Posição da Imagem do Diapositivo 1"/>
+          <p:cNvSpPr>
+            <a:spLocks noGrp="1" noRot="1" noChangeAspect="1"/>
+          </p:cNvSpPr>
+          <p:nvPr>
+            <p:ph type="sldImg"/>
+          </p:nvPr>
+        </p:nvSpPr>
+        <p:spPr/>
+      </p:sp>
+      <p:sp>
+        <p:nvSpPr>
+          <p:cNvPr id="3" name="Marcador de Posição de Notas 2"/>
+          <p:cNvSpPr>
+            <a:spLocks noGrp="1"/>
+          </p:cNvSpPr>
+          <p:nvPr>
+            <p:ph type="body" idx="1"/>
+          </p:nvPr>
+        </p:nvSpPr>
+        <p:spPr/>
+        <p:txBody>
+          <a:bodyPr/>
+          <a:lstStyle/>
+          <a:p>
             <a:r>
               <a:rPr lang="pt-PT" dirty="0"/>
               <a:t>- Lista de </a:t>
@@ -12093,7 +12185,149 @@
 </p:notes>
 </file>
 
-<file path=ppt/notesSlides/notesSlide2.xml><?xml version="1.0" encoding="utf-8"?>
+<file path=ppt/notesSlides/notesSlide3.xml><?xml version="1.0" encoding="utf-8"?>
+<p:notes xmlns:a="http://schemas.openxmlformats.org/drawingml/2006/main" xmlns:r="http://schemas.openxmlformats.org/officeDocument/2006/relationships" xmlns:p="http://schemas.openxmlformats.org/presentationml/2006/main">
+  <p:cSld>
+    <p:spTree>
+      <p:nvGrpSpPr>
+        <p:cNvPr id="1" name=""/>
+        <p:cNvGrpSpPr/>
+        <p:nvPr/>
+      </p:nvGrpSpPr>
+      <p:grpSpPr>
+        <a:xfrm>
+          <a:off x="0" y="0"/>
+          <a:ext cx="0" cy="0"/>
+          <a:chOff x="0" y="0"/>
+          <a:chExt cx="0" cy="0"/>
+        </a:xfrm>
+      </p:grpSpPr>
+      <p:sp>
+        <p:nvSpPr>
+          <p:cNvPr id="2" name="Marcador de Posição da Imagem do Diapositivo 1"/>
+          <p:cNvSpPr>
+            <a:spLocks noGrp="1" noRot="1" noChangeAspect="1"/>
+          </p:cNvSpPr>
+          <p:nvPr>
+            <p:ph type="sldImg"/>
+          </p:nvPr>
+        </p:nvSpPr>
+        <p:spPr/>
+      </p:sp>
+      <p:sp>
+        <p:nvSpPr>
+          <p:cNvPr id="3" name="Marcador de Posição de Notas 2"/>
+          <p:cNvSpPr>
+            <a:spLocks noGrp="1"/>
+          </p:cNvSpPr>
+          <p:nvPr>
+            <p:ph type="body" idx="1"/>
+          </p:nvPr>
+        </p:nvSpPr>
+        <p:spPr/>
+        <p:txBody>
+          <a:bodyPr/>
+          <a:lstStyle/>
+          <a:p>
+            <a:r>
+              <a:rPr lang="pt-PT" dirty="0"/>
+              <a:t>- Lista de </a:t>
+            </a:r>
+            <a:r>
+              <a:rPr lang="pt-PT" dirty="0" err="1"/>
+              <a:t>talks</a:t>
+            </a:r>
+            <a:endParaRPr lang="pt-PT" dirty="0"/>
+          </a:p>
+          <a:p>
+            <a:r>
+              <a:rPr lang="pt-PT" dirty="0"/>
+              <a:t>- Em cada </a:t>
+            </a:r>
+            <a:r>
+              <a:rPr lang="pt-PT" dirty="0" err="1"/>
+              <a:t>talk</a:t>
+            </a:r>
+            <a:r>
+              <a:rPr lang="pt-PT" dirty="0"/>
+              <a:t> todos podem criar perguntas</a:t>
+            </a:r>
+          </a:p>
+          <a:p>
+            <a:pPr marL="171450" indent="-171450">
+              <a:buFontTx/>
+              <a:buChar char="-"/>
+            </a:pPr>
+            <a:r>
+              <a:rPr lang="pt-PT" dirty="0"/>
+              <a:t>Utilizadores podem votar em perguntas e responder se quiser</a:t>
+            </a:r>
+          </a:p>
+          <a:p>
+            <a:pPr marL="171450" indent="-171450">
+              <a:buFontTx/>
+              <a:buChar char="-"/>
+            </a:pPr>
+            <a:r>
+              <a:rPr lang="pt-PT" dirty="0"/>
+              <a:t>Perguntas </a:t>
+            </a:r>
+            <a:r>
+              <a:rPr lang="pt-PT" dirty="0" err="1"/>
+              <a:t>sao</a:t>
+            </a:r>
+            <a:r>
+              <a:rPr lang="pt-PT" dirty="0"/>
+              <a:t> ordenadas por número de votos p/ </a:t>
+            </a:r>
+            <a:r>
+              <a:rPr lang="pt-PT" dirty="0" err="1"/>
+              <a:t>hosts</a:t>
+            </a:r>
+            <a:r>
+              <a:rPr lang="pt-PT" dirty="0"/>
+              <a:t> escolherem</a:t>
+            </a:r>
+          </a:p>
+        </p:txBody>
+      </p:sp>
+      <p:sp>
+        <p:nvSpPr>
+          <p:cNvPr id="4" name="Marcador de Posição do Número do Diapositivo 3"/>
+          <p:cNvSpPr>
+            <a:spLocks noGrp="1"/>
+          </p:cNvSpPr>
+          <p:nvPr>
+            <p:ph type="sldNum" sz="quarter" idx="5"/>
+          </p:nvPr>
+        </p:nvSpPr>
+        <p:spPr/>
+        <p:txBody>
+          <a:bodyPr/>
+          <a:lstStyle/>
+          <a:p>
+            <a:fld id="{3FF727AB-6EB0-49A3-90CE-927644F1B1A0}" type="slidenum">
+              <a:rPr lang="pt-PT" smtClean="0"/>
+              <a:t>4</a:t>
+            </a:fld>
+            <a:endParaRPr lang="pt-PT"/>
+          </a:p>
+        </p:txBody>
+      </p:sp>
+    </p:spTree>
+    <p:extLst>
+      <p:ext uri="{BB962C8B-B14F-4D97-AF65-F5344CB8AC3E}">
+        <p14:creationId xmlns:p14="http://schemas.microsoft.com/office/powerpoint/2010/main" val="3386703258"/>
+      </p:ext>
+    </p:extLst>
+  </p:cSld>
+  <p:clrMapOvr>
+    <a:masterClrMapping/>
+  </p:clrMapOvr>
+</p:notes>
+</file>
+
+<file path=ppt/notesSlides/notesSlide4.xml><?xml version="1.0" encoding="utf-8"?>
 <p:notes xmlns:a="http://schemas.openxmlformats.org/drawingml/2006/main" xmlns:r="http://schemas.openxmlformats.org/officeDocument/2006/relationships" xmlns:p="http://schemas.openxmlformats.org/presentationml/2006/main">
   <p:cSld>
     <p:spTree>
@@ -12222,7 +12456,7 @@
           <a:p>
             <a:fld id="{3FF727AB-6EB0-49A3-90CE-927644F1B1A0}" type="slidenum">
               <a:rPr lang="pt-PT" smtClean="0"/>
-              <a:t>4</a:t>
+              <a:t>5</a:t>
             </a:fld>
             <a:endParaRPr lang="pt-PT"/>
           </a:p>
@@ -12241,7 +12475,91 @@
 </p:notes>
 </file>
 
-<file path=ppt/notesSlides/notesSlide3.xml><?xml version="1.0" encoding="utf-8"?>
+<file path=ppt/notesSlides/notesSlide5.xml><?xml version="1.0" encoding="utf-8"?>
+<p:notes xmlns:a="http://schemas.openxmlformats.org/drawingml/2006/main" xmlns:r="http://schemas.openxmlformats.org/officeDocument/2006/relationships" xmlns:p="http://schemas.openxmlformats.org/presentationml/2006/main">
+  <p:cSld>
+    <p:spTree>
+      <p:nvGrpSpPr>
+        <p:cNvPr id="1" name=""/>
+        <p:cNvGrpSpPr/>
+        <p:nvPr/>
+      </p:nvGrpSpPr>
+      <p:grpSpPr>
+        <a:xfrm>
+          <a:off x="0" y="0"/>
+          <a:ext cx="0" cy="0"/>
+          <a:chOff x="0" y="0"/>
+          <a:chExt cx="0" cy="0"/>
+        </a:xfrm>
+      </p:grpSpPr>
+      <p:sp>
+        <p:nvSpPr>
+          <p:cNvPr id="2" name="Marcador de Posição da Imagem do Diapositivo 1"/>
+          <p:cNvSpPr>
+            <a:spLocks noGrp="1" noRot="1" noChangeAspect="1"/>
+          </p:cNvSpPr>
+          <p:nvPr>
+            <p:ph type="sldImg"/>
+          </p:nvPr>
+        </p:nvSpPr>
+        <p:spPr/>
+      </p:sp>
+      <p:sp>
+        <p:nvSpPr>
+          <p:cNvPr id="3" name="Marcador de Posição de Notas 2"/>
+          <p:cNvSpPr>
+            <a:spLocks noGrp="1"/>
+          </p:cNvSpPr>
+          <p:nvPr>
+            <p:ph type="body" idx="1"/>
+          </p:nvPr>
+        </p:nvSpPr>
+        <p:spPr/>
+        <p:txBody>
+          <a:bodyPr/>
+          <a:lstStyle/>
+          <a:p>
+            <a:endParaRPr lang="pt-PT" dirty="0"/>
+          </a:p>
+        </p:txBody>
+      </p:sp>
+      <p:sp>
+        <p:nvSpPr>
+          <p:cNvPr id="4" name="Marcador de Posição do Número do Diapositivo 3"/>
+          <p:cNvSpPr>
+            <a:spLocks noGrp="1"/>
+          </p:cNvSpPr>
+          <p:nvPr>
+            <p:ph type="sldNum" sz="quarter" idx="5"/>
+          </p:nvPr>
+        </p:nvSpPr>
+        <p:spPr/>
+        <p:txBody>
+          <a:bodyPr/>
+          <a:lstStyle/>
+          <a:p>
+            <a:fld id="{3FF727AB-6EB0-49A3-90CE-927644F1B1A0}" type="slidenum">
+              <a:rPr lang="pt-PT" smtClean="0"/>
+              <a:t>6</a:t>
+            </a:fld>
+            <a:endParaRPr lang="pt-PT"/>
+          </a:p>
+        </p:txBody>
+      </p:sp>
+    </p:spTree>
+    <p:extLst>
+      <p:ext uri="{BB962C8B-B14F-4D97-AF65-F5344CB8AC3E}">
+        <p14:creationId xmlns:p14="http://schemas.microsoft.com/office/powerpoint/2010/main" val="3229820702"/>
+      </p:ext>
+    </p:extLst>
+  </p:cSld>
+  <p:clrMapOvr>
+    <a:masterClrMapping/>
+  </p:clrMapOvr>
+</p:notes>
+</file>
+
+<file path=ppt/notesSlides/notesSlide6.xml><?xml version="1.0" encoding="utf-8"?>
 <p:notes xmlns:a="http://schemas.openxmlformats.org/drawingml/2006/main" xmlns:r="http://schemas.openxmlformats.org/officeDocument/2006/relationships" xmlns:p="http://schemas.openxmlformats.org/presentationml/2006/main">
   <p:cSld>
     <p:spTree>
@@ -12366,7 +12684,7 @@
           <a:p>
             <a:fld id="{3FF727AB-6EB0-49A3-90CE-927644F1B1A0}" type="slidenum">
               <a:rPr lang="pt-PT" smtClean="0"/>
-              <a:t>5</a:t>
+              <a:t>8</a:t>
             </a:fld>
             <a:endParaRPr lang="pt-PT"/>
           </a:p>
@@ -12385,7 +12703,7 @@
 </p:notes>
 </file>
 
-<file path=ppt/notesSlides/notesSlide4.xml><?xml version="1.0" encoding="utf-8"?>
+<file path=ppt/notesSlides/notesSlide7.xml><?xml version="1.0" encoding="utf-8"?>
 <p:notes xmlns:a="http://schemas.openxmlformats.org/drawingml/2006/main" xmlns:r="http://schemas.openxmlformats.org/officeDocument/2006/relationships" xmlns:p="http://schemas.openxmlformats.org/presentationml/2006/main">
   <p:cSld>
     <p:spTree>
@@ -12486,7 +12804,7 @@
           <a:p>
             <a:fld id="{3FF727AB-6EB0-49A3-90CE-927644F1B1A0}" type="slidenum">
               <a:rPr lang="pt-PT" smtClean="0"/>
-              <a:t>6</a:t>
+              <a:t>9</a:t>
             </a:fld>
             <a:endParaRPr lang="pt-PT"/>
           </a:p>
@@ -18908,6 +19226,238 @@
           <p:cNvPr id="2" name="Título 1">
             <a:extLst>
               <a:ext uri="{FF2B5EF4-FFF2-40B4-BE49-F238E27FC236}">
+                <a16:creationId xmlns:a16="http://schemas.microsoft.com/office/drawing/2014/main" id="{1B90F050-D06B-4BB7-A90A-9B1C61159E54}"/>
+              </a:ext>
+            </a:extLst>
+          </p:cNvPr>
+          <p:cNvSpPr>
+            <a:spLocks noGrp="1"/>
+          </p:cNvSpPr>
+          <p:nvPr>
+            <p:ph type="title"/>
+          </p:nvPr>
+        </p:nvSpPr>
+        <p:spPr>
+          <a:xfrm>
+            <a:off x="1760706" y="685800"/>
+            <a:ext cx="9742318" cy="1752599"/>
+          </a:xfrm>
+        </p:spPr>
+        <p:txBody>
+          <a:bodyPr>
+            <a:normAutofit/>
+          </a:bodyPr>
+          <a:lstStyle/>
+          <a:p>
+            <a:r>
+              <a:rPr lang="pt-PT"/>
+              <a:t>Core features</a:t>
+            </a:r>
+            <a:br>
+              <a:rPr lang="pt-PT"/>
+            </a:br>
+            <a:endParaRPr lang="pt-PT"/>
+          </a:p>
+        </p:txBody>
+      </p:sp>
+      <p:pic>
+        <p:nvPicPr>
+          <p:cNvPr id="1030" name="Picture 6">
+            <a:extLst>
+              <a:ext uri="{FF2B5EF4-FFF2-40B4-BE49-F238E27FC236}">
+                <a16:creationId xmlns:a16="http://schemas.microsoft.com/office/drawing/2014/main" id="{BD45A85D-FC1A-48AE-9F3B-ABEA34DF2202}"/>
+              </a:ext>
+            </a:extLst>
+          </p:cNvPr>
+          <p:cNvPicPr>
+            <a:picLocks noChangeAspect="1" noChangeArrowheads="1"/>
+          </p:cNvPicPr>
+          <p:nvPr/>
+        </p:nvPicPr>
+        <p:blipFill>
+          <a:blip r:embed="rId3">
+            <a:extLst>
+              <a:ext uri="{28A0092B-C50C-407E-A947-70E740481C1C}">
+                <a14:useLocalDpi xmlns:a14="http://schemas.microsoft.com/office/drawing/2010/main" val="0"/>
+              </a:ext>
+            </a:extLst>
+          </a:blip>
+          <a:srcRect/>
+          <a:stretch>
+            <a:fillRect/>
+          </a:stretch>
+        </p:blipFill>
+        <p:spPr bwMode="auto">
+          <a:xfrm>
+            <a:off x="8334376" y="0"/>
+            <a:ext cx="3857625" cy="6858000"/>
+          </a:xfrm>
+          <a:prstGeom prst="rect">
+            <a:avLst/>
+          </a:prstGeom>
+          <a:noFill/>
+          <a:extLst>
+            <a:ext uri="{909E8E84-426E-40DD-AFC4-6F175D3DCCD1}">
+              <a14:hiddenFill xmlns:a14="http://schemas.microsoft.com/office/drawing/2010/main">
+                <a:solidFill>
+                  <a:srgbClr val="FFFFFF"/>
+                </a:solidFill>
+              </a14:hiddenFill>
+            </a:ext>
+          </a:extLst>
+        </p:spPr>
+      </p:pic>
+      <p:pic>
+        <p:nvPicPr>
+          <p:cNvPr id="1032" name="Picture 8">
+            <a:extLst>
+              <a:ext uri="{FF2B5EF4-FFF2-40B4-BE49-F238E27FC236}">
+                <a16:creationId xmlns:a16="http://schemas.microsoft.com/office/drawing/2014/main" id="{95AF4385-125D-4E81-B57D-1CAC94F58790}"/>
+              </a:ext>
+            </a:extLst>
+          </p:cNvPr>
+          <p:cNvPicPr>
+            <a:picLocks noChangeAspect="1" noChangeArrowheads="1"/>
+          </p:cNvPicPr>
+          <p:nvPr/>
+        </p:nvPicPr>
+        <p:blipFill>
+          <a:blip r:embed="rId4">
+            <a:extLst>
+              <a:ext uri="{28A0092B-C50C-407E-A947-70E740481C1C}">
+                <a14:useLocalDpi xmlns:a14="http://schemas.microsoft.com/office/drawing/2010/main" val="0"/>
+              </a:ext>
+            </a:extLst>
+          </a:blip>
+          <a:srcRect/>
+          <a:stretch>
+            <a:fillRect/>
+          </a:stretch>
+        </p:blipFill>
+        <p:spPr bwMode="auto">
+          <a:xfrm>
+            <a:off x="0" y="0"/>
+            <a:ext cx="3857625" cy="6858000"/>
+          </a:xfrm>
+          <a:prstGeom prst="rect">
+            <a:avLst/>
+          </a:prstGeom>
+          <a:noFill/>
+          <a:extLst>
+            <a:ext uri="{909E8E84-426E-40DD-AFC4-6F175D3DCCD1}">
+              <a14:hiddenFill xmlns:a14="http://schemas.microsoft.com/office/drawing/2010/main">
+                <a:solidFill>
+                  <a:srgbClr val="FFFFFF"/>
+                </a:solidFill>
+              </a14:hiddenFill>
+            </a:ext>
+          </a:extLst>
+        </p:spPr>
+      </p:pic>
+      <p:pic>
+        <p:nvPicPr>
+          <p:cNvPr id="1034" name="Picture 10">
+            <a:extLst>
+              <a:ext uri="{FF2B5EF4-FFF2-40B4-BE49-F238E27FC236}">
+                <a16:creationId xmlns:a16="http://schemas.microsoft.com/office/drawing/2014/main" id="{96C3871A-1F9E-46C4-B061-8E7A6CCEA10D}"/>
+              </a:ext>
+            </a:extLst>
+          </p:cNvPr>
+          <p:cNvPicPr>
+            <a:picLocks noChangeAspect="1" noChangeArrowheads="1"/>
+          </p:cNvPicPr>
+          <p:nvPr/>
+        </p:nvPicPr>
+        <p:blipFill>
+          <a:blip r:embed="rId5">
+            <a:extLst>
+              <a:ext uri="{28A0092B-C50C-407E-A947-70E740481C1C}">
+                <a14:useLocalDpi xmlns:a14="http://schemas.microsoft.com/office/drawing/2010/main" val="0"/>
+              </a:ext>
+            </a:extLst>
+          </a:blip>
+          <a:srcRect/>
+          <a:stretch>
+            <a:fillRect/>
+          </a:stretch>
+        </p:blipFill>
+        <p:spPr bwMode="auto">
+          <a:xfrm>
+            <a:off x="4167188" y="0"/>
+            <a:ext cx="3857625" cy="6858000"/>
+          </a:xfrm>
+          <a:prstGeom prst="rect">
+            <a:avLst/>
+          </a:prstGeom>
+          <a:noFill/>
+          <a:extLst>
+            <a:ext uri="{909E8E84-426E-40DD-AFC4-6F175D3DCCD1}">
+              <a14:hiddenFill xmlns:a14="http://schemas.microsoft.com/office/drawing/2010/main">
+                <a:solidFill>
+                  <a:srgbClr val="FFFFFF"/>
+                </a:solidFill>
+              </a14:hiddenFill>
+            </a:ext>
+          </a:extLst>
+        </p:spPr>
+      </p:pic>
+    </p:spTree>
+    <p:extLst>
+      <p:ext uri="{BB962C8B-B14F-4D97-AF65-F5344CB8AC3E}">
+        <p14:creationId xmlns:p14="http://schemas.microsoft.com/office/powerpoint/2010/main" val="3350165239"/>
+      </p:ext>
+    </p:extLst>
+  </p:cSld>
+  <p:clrMapOvr>
+    <a:masterClrMapping/>
+  </p:clrMapOvr>
+</p:sld>
+</file>
+
+<file path=ppt/slides/slide5.xml><?xml version="1.0" encoding="utf-8"?>
+<p:sld xmlns:a="http://schemas.openxmlformats.org/drawingml/2006/main" xmlns:r="http://schemas.openxmlformats.org/officeDocument/2006/relationships" xmlns:p="http://schemas.openxmlformats.org/presentationml/2006/main">
+  <p:cSld>
+    <p:bg>
+      <p:bgPr>
+        <a:gradFill rotWithShape="1">
+          <a:gsLst>
+            <a:gs pos="0">
+              <a:schemeClr val="bg2">
+                <a:tint val="90000"/>
+                <a:lumMod val="110000"/>
+              </a:schemeClr>
+            </a:gs>
+            <a:gs pos="100000">
+              <a:schemeClr val="bg2">
+                <a:shade val="64000"/>
+                <a:lumMod val="98000"/>
+              </a:schemeClr>
+            </a:gs>
+          </a:gsLst>
+          <a:lin ang="5400000" scaled="0"/>
+        </a:gradFill>
+        <a:effectLst/>
+      </p:bgPr>
+    </p:bg>
+    <p:spTree>
+      <p:nvGrpSpPr>
+        <p:cNvPr id="1" name=""/>
+        <p:cNvGrpSpPr/>
+        <p:nvPr/>
+      </p:nvGrpSpPr>
+      <p:grpSpPr>
+        <a:xfrm>
+          <a:off x="0" y="0"/>
+          <a:ext cx="0" cy="0"/>
+          <a:chOff x="0" y="0"/>
+          <a:chExt cx="0" cy="0"/>
+        </a:xfrm>
+      </p:grpSpPr>
+      <p:sp>
+        <p:nvSpPr>
+          <p:cNvPr id="2" name="Título 1">
+            <a:extLst>
+              <a:ext uri="{FF2B5EF4-FFF2-40B4-BE49-F238E27FC236}">
                 <a16:creationId xmlns:a16="http://schemas.microsoft.com/office/drawing/2014/main" id="{BB6D8594-AE54-4B76-9C59-CA872F14874B}"/>
               </a:ext>
             </a:extLst>
@@ -18991,7 +19541,305 @@
 </p:sld>
 </file>
 
-<file path=ppt/slides/slide5.xml><?xml version="1.0" encoding="utf-8"?>
+<file path=ppt/slides/slide6.xml><?xml version="1.0" encoding="utf-8"?>
+<p:sld xmlns:a="http://schemas.openxmlformats.org/drawingml/2006/main" xmlns:r="http://schemas.openxmlformats.org/officeDocument/2006/relationships" xmlns:p="http://schemas.openxmlformats.org/presentationml/2006/main">
+  <p:cSld>
+    <p:spTree>
+      <p:nvGrpSpPr>
+        <p:cNvPr id="1" name=""/>
+        <p:cNvGrpSpPr/>
+        <p:nvPr/>
+      </p:nvGrpSpPr>
+      <p:grpSpPr>
+        <a:xfrm>
+          <a:off x="0" y="0"/>
+          <a:ext cx="0" cy="0"/>
+          <a:chOff x="0" y="0"/>
+          <a:chExt cx="0" cy="0"/>
+        </a:xfrm>
+      </p:grpSpPr>
+      <p:pic>
+        <p:nvPicPr>
+          <p:cNvPr id="2050" name="Picture 2" descr="Uma imagem com captura de ecrã&#10;&#10;Descrição gerada automaticamente">
+            <a:extLst>
+              <a:ext uri="{FF2B5EF4-FFF2-40B4-BE49-F238E27FC236}">
+                <a16:creationId xmlns:a16="http://schemas.microsoft.com/office/drawing/2014/main" id="{7A6ACAC8-5511-4BBF-ABBE-9B5DBAD1C7A4}"/>
+              </a:ext>
+            </a:extLst>
+          </p:cNvPr>
+          <p:cNvPicPr>
+            <a:picLocks noChangeAspect="1" noChangeArrowheads="1"/>
+          </p:cNvPicPr>
+          <p:nvPr/>
+        </p:nvPicPr>
+        <p:blipFill>
+          <a:blip r:embed="rId3">
+            <a:extLst>
+              <a:ext uri="{28A0092B-C50C-407E-A947-70E740481C1C}">
+                <a14:useLocalDpi xmlns:a14="http://schemas.microsoft.com/office/drawing/2010/main" val="0"/>
+              </a:ext>
+            </a:extLst>
+          </a:blip>
+          <a:srcRect/>
+          <a:stretch>
+            <a:fillRect/>
+          </a:stretch>
+        </p:blipFill>
+        <p:spPr bwMode="auto">
+          <a:xfrm>
+            <a:off x="0" y="0"/>
+            <a:ext cx="3857625" cy="6858000"/>
+          </a:xfrm>
+          <a:prstGeom prst="rect">
+            <a:avLst/>
+          </a:prstGeom>
+          <a:noFill/>
+          <a:extLst>
+            <a:ext uri="{909E8E84-426E-40DD-AFC4-6F175D3DCCD1}">
+              <a14:hiddenFill xmlns:a14="http://schemas.microsoft.com/office/drawing/2010/main">
+                <a:solidFill>
+                  <a:srgbClr val="FFFFFF"/>
+                </a:solidFill>
+              </a14:hiddenFill>
+            </a:ext>
+          </a:extLst>
+        </p:spPr>
+      </p:pic>
+      <p:pic>
+        <p:nvPicPr>
+          <p:cNvPr id="2054" name="Picture 6" descr="Uma imagem com captura de ecrã&#10;&#10;Descrição gerada automaticamente">
+            <a:extLst>
+              <a:ext uri="{FF2B5EF4-FFF2-40B4-BE49-F238E27FC236}">
+                <a16:creationId xmlns:a16="http://schemas.microsoft.com/office/drawing/2014/main" id="{D150AD2E-8A17-4101-9DE5-B5E1EA12CA3F}"/>
+              </a:ext>
+            </a:extLst>
+          </p:cNvPr>
+          <p:cNvPicPr>
+            <a:picLocks noChangeAspect="1" noChangeArrowheads="1"/>
+          </p:cNvPicPr>
+          <p:nvPr/>
+        </p:nvPicPr>
+        <p:blipFill>
+          <a:blip r:embed="rId4">
+            <a:extLst>
+              <a:ext uri="{28A0092B-C50C-407E-A947-70E740481C1C}">
+                <a14:useLocalDpi xmlns:a14="http://schemas.microsoft.com/office/drawing/2010/main" val="0"/>
+              </a:ext>
+            </a:extLst>
+          </a:blip>
+          <a:srcRect/>
+          <a:stretch>
+            <a:fillRect/>
+          </a:stretch>
+        </p:blipFill>
+        <p:spPr bwMode="auto">
+          <a:xfrm>
+            <a:off x="4167188" y="0"/>
+            <a:ext cx="3857625" cy="6858000"/>
+          </a:xfrm>
+          <a:prstGeom prst="rect">
+            <a:avLst/>
+          </a:prstGeom>
+          <a:noFill/>
+          <a:extLst>
+            <a:ext uri="{909E8E84-426E-40DD-AFC4-6F175D3DCCD1}">
+              <a14:hiddenFill xmlns:a14="http://schemas.microsoft.com/office/drawing/2010/main">
+                <a:solidFill>
+                  <a:srgbClr val="FFFFFF"/>
+                </a:solidFill>
+              </a14:hiddenFill>
+            </a:ext>
+          </a:extLst>
+        </p:spPr>
+      </p:pic>
+      <p:pic>
+        <p:nvPicPr>
+          <p:cNvPr id="2056" name="Picture 8" descr="Uma imagem com captura de ecrã&#10;&#10;Descrição gerada automaticamente">
+            <a:extLst>
+              <a:ext uri="{FF2B5EF4-FFF2-40B4-BE49-F238E27FC236}">
+                <a16:creationId xmlns:a16="http://schemas.microsoft.com/office/drawing/2014/main" id="{E8A244C5-EEBD-4829-A281-19998181F032}"/>
+              </a:ext>
+            </a:extLst>
+          </p:cNvPr>
+          <p:cNvPicPr>
+            <a:picLocks noChangeAspect="1" noChangeArrowheads="1"/>
+          </p:cNvPicPr>
+          <p:nvPr/>
+        </p:nvPicPr>
+        <p:blipFill>
+          <a:blip r:embed="rId5">
+            <a:extLst>
+              <a:ext uri="{28A0092B-C50C-407E-A947-70E740481C1C}">
+                <a14:useLocalDpi xmlns:a14="http://schemas.microsoft.com/office/drawing/2010/main" val="0"/>
+              </a:ext>
+            </a:extLst>
+          </a:blip>
+          <a:srcRect/>
+          <a:stretch>
+            <a:fillRect/>
+          </a:stretch>
+        </p:blipFill>
+        <p:spPr bwMode="auto">
+          <a:xfrm>
+            <a:off x="8334375" y="0"/>
+            <a:ext cx="3857625" cy="6858000"/>
+          </a:xfrm>
+          <a:prstGeom prst="rect">
+            <a:avLst/>
+          </a:prstGeom>
+          <a:noFill/>
+          <a:extLst>
+            <a:ext uri="{909E8E84-426E-40DD-AFC4-6F175D3DCCD1}">
+              <a14:hiddenFill xmlns:a14="http://schemas.microsoft.com/office/drawing/2010/main">
+                <a:solidFill>
+                  <a:srgbClr val="FFFFFF"/>
+                </a:solidFill>
+              </a14:hiddenFill>
+            </a:ext>
+          </a:extLst>
+        </p:spPr>
+      </p:pic>
+    </p:spTree>
+    <p:extLst>
+      <p:ext uri="{BB962C8B-B14F-4D97-AF65-F5344CB8AC3E}">
+        <p14:creationId xmlns:p14="http://schemas.microsoft.com/office/powerpoint/2010/main" val="2327166870"/>
+      </p:ext>
+    </p:extLst>
+  </p:cSld>
+  <p:clrMapOvr>
+    <a:masterClrMapping/>
+  </p:clrMapOvr>
+</p:sld>
+</file>
+
+<file path=ppt/slides/slide7.xml><?xml version="1.0" encoding="utf-8"?>
+<p:sld xmlns:a="http://schemas.openxmlformats.org/drawingml/2006/main" xmlns:r="http://schemas.openxmlformats.org/officeDocument/2006/relationships" xmlns:p="http://schemas.openxmlformats.org/presentationml/2006/main">
+  <p:cSld>
+    <p:spTree>
+      <p:nvGrpSpPr>
+        <p:cNvPr id="1" name=""/>
+        <p:cNvGrpSpPr/>
+        <p:nvPr/>
+      </p:nvGrpSpPr>
+      <p:grpSpPr>
+        <a:xfrm>
+          <a:off x="0" y="0"/>
+          <a:ext cx="0" cy="0"/>
+          <a:chOff x="0" y="0"/>
+          <a:chExt cx="0" cy="0"/>
+        </a:xfrm>
+      </p:grpSpPr>
+      <p:sp>
+        <p:nvSpPr>
+          <p:cNvPr id="2" name="Título 1">
+            <a:extLst>
+              <a:ext uri="{FF2B5EF4-FFF2-40B4-BE49-F238E27FC236}">
+                <a16:creationId xmlns:a16="http://schemas.microsoft.com/office/drawing/2014/main" id="{FF8D70CC-F5BD-4062-8557-902CA15ED18A}"/>
+              </a:ext>
+            </a:extLst>
+          </p:cNvPr>
+          <p:cNvSpPr>
+            <a:spLocks noGrp="1"/>
+          </p:cNvSpPr>
+          <p:nvPr>
+            <p:ph type="title"/>
+          </p:nvPr>
+        </p:nvSpPr>
+        <p:spPr/>
+        <p:txBody>
+          <a:bodyPr/>
+          <a:lstStyle/>
+          <a:p>
+            <a:endParaRPr lang="pt-PT"/>
+          </a:p>
+        </p:txBody>
+      </p:sp>
+      <p:sp>
+        <p:nvSpPr>
+          <p:cNvPr id="3" name="Marcador de Posição de Conteúdo 2">
+            <a:extLst>
+              <a:ext uri="{FF2B5EF4-FFF2-40B4-BE49-F238E27FC236}">
+                <a16:creationId xmlns:a16="http://schemas.microsoft.com/office/drawing/2014/main" id="{E0417F8A-8DAD-4415-9533-4FBBD22716B6}"/>
+              </a:ext>
+            </a:extLst>
+          </p:cNvPr>
+          <p:cNvSpPr>
+            <a:spLocks noGrp="1"/>
+          </p:cNvSpPr>
+          <p:nvPr>
+            <p:ph idx="1"/>
+          </p:nvPr>
+        </p:nvSpPr>
+        <p:spPr/>
+        <p:txBody>
+          <a:bodyPr/>
+          <a:lstStyle/>
+          <a:p>
+            <a:endParaRPr lang="pt-PT"/>
+          </a:p>
+        </p:txBody>
+      </p:sp>
+      <p:pic>
+        <p:nvPicPr>
+          <p:cNvPr id="4" name="Picture 4">
+            <a:extLst>
+              <a:ext uri="{FF2B5EF4-FFF2-40B4-BE49-F238E27FC236}">
+                <a16:creationId xmlns:a16="http://schemas.microsoft.com/office/drawing/2014/main" id="{31295285-582E-4203-AE36-DCBAADE02CF8}"/>
+              </a:ext>
+            </a:extLst>
+          </p:cNvPr>
+          <p:cNvPicPr>
+            <a:picLocks noChangeAspect="1" noChangeArrowheads="1"/>
+          </p:cNvPicPr>
+          <p:nvPr/>
+        </p:nvPicPr>
+        <p:blipFill>
+          <a:blip r:embed="rId2">
+            <a:extLst>
+              <a:ext uri="{28A0092B-C50C-407E-A947-70E740481C1C}">
+                <a14:useLocalDpi xmlns:a14="http://schemas.microsoft.com/office/drawing/2010/main" val="0"/>
+              </a:ext>
+            </a:extLst>
+          </a:blip>
+          <a:srcRect/>
+          <a:stretch>
+            <a:fillRect/>
+          </a:stretch>
+        </p:blipFill>
+        <p:spPr bwMode="auto">
+          <a:xfrm>
+            <a:off x="8334377" y="0"/>
+            <a:ext cx="3857625" cy="6858000"/>
+          </a:xfrm>
+          <a:prstGeom prst="rect">
+            <a:avLst/>
+          </a:prstGeom>
+          <a:noFill/>
+          <a:extLst>
+            <a:ext uri="{909E8E84-426E-40DD-AFC4-6F175D3DCCD1}">
+              <a14:hiddenFill xmlns:a14="http://schemas.microsoft.com/office/drawing/2010/main">
+                <a:solidFill>
+                  <a:srgbClr val="FFFFFF"/>
+                </a:solidFill>
+              </a14:hiddenFill>
+            </a:ext>
+          </a:extLst>
+        </p:spPr>
+      </p:pic>
+    </p:spTree>
+    <p:extLst>
+      <p:ext uri="{BB962C8B-B14F-4D97-AF65-F5344CB8AC3E}">
+        <p14:creationId xmlns:p14="http://schemas.microsoft.com/office/powerpoint/2010/main" val="3629637208"/>
+      </p:ext>
+    </p:extLst>
+  </p:cSld>
+  <p:clrMapOvr>
+    <a:masterClrMapping/>
+  </p:clrMapOvr>
+</p:sld>
+</file>
+
+<file path=ppt/slides/slide8.xml><?xml version="1.0" encoding="utf-8"?>
 <p:sld xmlns:a="http://schemas.openxmlformats.org/drawingml/2006/main" xmlns:r="http://schemas.openxmlformats.org/officeDocument/2006/relationships" xmlns:p="http://schemas.openxmlformats.org/presentationml/2006/main">
   <p:cSld>
     <p:bg>
@@ -19787,7 +20635,7 @@
 </p:sld>
 </file>
 
-<file path=ppt/slides/slide6.xml><?xml version="1.0" encoding="utf-8"?>
+<file path=ppt/slides/slide9.xml><?xml version="1.0" encoding="utf-8"?>
 <p:sld xmlns:a="http://schemas.openxmlformats.org/drawingml/2006/main" xmlns:r="http://schemas.openxmlformats.org/officeDocument/2006/relationships" xmlns:p="http://schemas.openxmlformats.org/presentationml/2006/main">
   <p:cSld>
     <p:bg>

</xml_diff>